<commit_message>
fix webglmath <vec|mat><1|2|3|4>Array.provideDelegate to include [0]
</commit_message>
<xml_diff>
--- a/projects/kog.3gr.020-gom/lab.pptx
+++ b/projects/kog.3gr.020-gom/lab.pptx
@@ -240,7 +240,7 @@
           <a:p>
             <a:fld id="{865F36A5-2623-498E-9F4A-90F99F2366D7}" type="datetimeFigureOut">
               <a:rPr lang="en-US" smtClean="0"/>
-              <a:t>3/2/2022</a:t>
+              <a:t>3/23/2022</a:t>
             </a:fld>
             <a:endParaRPr lang="en-US"/>
           </a:p>
@@ -939,7 +939,7 @@
           <a:p>
             <a:fld id="{233D5BDB-207A-4240-9DD0-70E5211C08C1}" type="datetimeFigureOut">
               <a:rPr lang="en-US" smtClean="0"/>
-              <a:t>3/2/2022</a:t>
+              <a:t>3/23/2022</a:t>
             </a:fld>
             <a:endParaRPr lang="en-US"/>
           </a:p>
@@ -1184,7 +1184,7 @@
             <a:fld id="{233D5BDB-207A-4240-9DD0-70E5211C08C1}" type="datetimeFigureOut">
               <a:rPr lang="en-US" smtClean="0"/>
               <a:pPr/>
-              <a:t>3/2/2022</a:t>
+              <a:t>3/23/2022</a:t>
             </a:fld>
             <a:endParaRPr lang="en-US"/>
           </a:p>
@@ -6199,7 +6199,7 @@
           <p:cNvPr id="5" name="Rectangle 4">
             <a:extLst>
               <a:ext uri="{FF2B5EF4-FFF2-40B4-BE49-F238E27FC236}">
-                <a16:creationId xmlns:a16="http://schemas.microsoft.com/office/drawing/2014/main" id="{59009544-E13B-4985-B863-2742A3B9D4E7}"/>
+                <a16:creationId xmlns:a16="http://schemas.microsoft.com/office/drawing/2014/main" xmlns="" id="{59009544-E13B-4985-B863-2742A3B9D4E7}"/>
               </a:ext>
             </a:extLst>
           </p:cNvPr>
@@ -6628,7 +6628,12 @@
             <p:ph type="title"/>
           </p:nvPr>
         </p:nvSpPr>
-        <p:spPr/>
+        <p:spPr>
+          <a:xfrm>
+            <a:off x="628650" y="383598"/>
+            <a:ext cx="7886700" cy="1325563"/>
+          </a:xfrm>
+        </p:spPr>
         <p:txBody>
           <a:bodyPr/>
           <a:lstStyle/>
@@ -10030,7 +10035,7 @@
           <p:cNvPr id="13" name="TextBox 12">
             <a:extLst>
               <a:ext uri="{FF2B5EF4-FFF2-40B4-BE49-F238E27FC236}">
-                <a16:creationId xmlns:a16="http://schemas.microsoft.com/office/drawing/2014/main" id="{BE527B2B-123C-4E8B-AC8A-EF0509585009}"/>
+                <a16:creationId xmlns:a16="http://schemas.microsoft.com/office/drawing/2014/main" xmlns="" id="{BE527B2B-123C-4E8B-AC8A-EF0509585009}"/>
               </a:ext>
             </a:extLst>
           </p:cNvPr>
@@ -10079,7 +10084,7 @@
           <p:cNvPr id="14" name="Straight Arrow Connector 13">
             <a:extLst>
               <a:ext uri="{FF2B5EF4-FFF2-40B4-BE49-F238E27FC236}">
-                <a16:creationId xmlns:a16="http://schemas.microsoft.com/office/drawing/2014/main" id="{A85CB5E7-3585-4B3C-B7C0-89912515F204}"/>
+                <a16:creationId xmlns:a16="http://schemas.microsoft.com/office/drawing/2014/main" xmlns="" id="{A85CB5E7-3585-4B3C-B7C0-89912515F204}"/>
               </a:ext>
             </a:extLst>
           </p:cNvPr>
@@ -20570,6 +20575,10 @@
             <a:r>
               <a:rPr lang="hu-HU" dirty="0"/>
               <a:t> osztály </a:t>
+            </a:r>
+            <a:r>
+              <a:rPr lang="en-US" dirty="0"/>
+              <a:t/>
             </a:r>
             <a:br>
               <a:rPr lang="en-US" dirty="0"/>

</xml_diff>